<commit_message>
Updated David's presentations for ISS
</commit_message>
<xml_diff>
--- a/final-presentations/2021-03-25-iss/01-overview.pptx
+++ b/final-presentations/2021-03-25-iss/01-overview.pptx
@@ -12,7 +12,7 @@
   </p:handoutMasterIdLst>
   <p:sldIdLst>
     <p:sldId id="318" r:id="rId5"/>
-    <p:sldId id="563" r:id="rId6"/>
+    <p:sldId id="320" r:id="rId6"/>
     <p:sldId id="1819" r:id="rId7"/>
     <p:sldId id="325" r:id="rId8"/>
     <p:sldId id="1823" r:id="rId9"/>
@@ -23,7 +23,7 @@
     <p:sldId id="1820" r:id="rId14"/>
     <p:sldId id="279" r:id="rId15"/>
     <p:sldId id="1845" r:id="rId16"/>
-    <p:sldId id="257" r:id="rId17"/>
+    <p:sldId id="259" r:id="rId17"/>
   </p:sldIdLst>
   <p:sldSz cx="12188825" cy="6858000"/>
   <p:notesSz cx="7010400" cy="9296400"/>
@@ -267,7 +267,7 @@
           <a:p>
             <a:fld id="{0B842F42-2CE9-4E35-95C1-410DC08A50B1}" type="datetimeFigureOut">
               <a:rPr lang="en-US" smtClean="0"/>
-              <a:t>10/8/2020</a:t>
+              <a:t>3/21/2021</a:t>
             </a:fld>
             <a:endParaRPr lang="en-US"/>
           </a:p>
@@ -432,7 +432,7 @@
           <a:p>
             <a:fld id="{6F282904-F315-4730-8D91-37D99E141A6F}" type="datetimeFigureOut">
               <a:rPr lang="en-US" smtClean="0"/>
-              <a:t>10/8/2020</a:t>
+              <a:t>3/21/2021</a:t>
             </a:fld>
             <a:endParaRPr lang="en-US"/>
           </a:p>
@@ -4440,7 +4440,7 @@
           <a:p>
             <a:r>
               <a:rPr lang="en-US" sz="2000" dirty="0"/>
-              <a:t>Better Scientific Software Tutorial, SC20, November 2020</a:t>
+              <a:t>Better Scientific Software Tutorial, ISS, March 2021</a:t>
             </a:r>
           </a:p>
         </p:txBody>
@@ -6299,7 +6299,7 @@
 </file>
 
 <file path=ppt/slides/slide13.xml><?xml version="1.0" encoding="utf-8"?>
-<p:sld xmlns:a="http://schemas.openxmlformats.org/drawingml/2006/main" xmlns:r="http://schemas.openxmlformats.org/officeDocument/2006/relationships" xmlns:p="http://schemas.openxmlformats.org/presentationml/2006/main" showMasterSp="0">
+<p:sld xmlns:a="http://schemas.openxmlformats.org/drawingml/2006/main" xmlns:r="http://schemas.openxmlformats.org/officeDocument/2006/relationships" xmlns:p="http://schemas.openxmlformats.org/presentationml/2006/main">
   <p:cSld>
     <p:spTree>
       <p:nvGrpSpPr>
@@ -6357,16 +6357,11 @@
           </p:cNvGraphicFramePr>
           <p:nvPr>
             <p:ph idx="1"/>
-            <p:extLst>
-              <p:ext uri="{D42A27DB-BD31-4B8C-83A1-F6EECF244321}">
-                <p14:modId xmlns:p14="http://schemas.microsoft.com/office/powerpoint/2010/main" val="312120117"/>
-              </p:ext>
-            </p:extLst>
           </p:nvPr>
         </p:nvGraphicFramePr>
         <p:xfrm>
-          <a:off x="482119" y="879117"/>
-          <a:ext cx="11224586" cy="5608320"/>
+          <a:off x="1055369" y="916940"/>
+          <a:ext cx="10078086" cy="5024120"/>
         </p:xfrm>
         <a:graphic>
           <a:graphicData uri="http://schemas.openxmlformats.org/drawingml/2006/table">
@@ -6375,38 +6370,31 @@
                 <a:tableStyleId>{5C22544A-7EE6-4342-B048-85BDC9FD1C3A}</a:tableStyleId>
               </a:tblPr>
               <a:tblGrid>
-                <a:gridCol w="1953967">
+                <a:gridCol w="1826183">
                   <a:extLst>
                     <a:ext uri="{9D8B030D-6E8A-4147-A177-3AD203B41FA5}">
                       <a16:colId xmlns:a16="http://schemas.microsoft.com/office/drawing/2014/main" val="3446576009"/>
                     </a:ext>
                   </a:extLst>
                 </a:gridCol>
-                <a:gridCol w="927012">
+                <a:gridCol w="1003610">
                   <a:extLst>
                     <a:ext uri="{9D8B030D-6E8A-4147-A177-3AD203B41FA5}">
                       <a16:colId xmlns:a16="http://schemas.microsoft.com/office/drawing/2014/main" val="339314737"/>
                     </a:ext>
                   </a:extLst>
                 </a:gridCol>
-                <a:gridCol w="4502632">
+                <a:gridCol w="4293220">
                   <a:extLst>
                     <a:ext uri="{9D8B030D-6E8A-4147-A177-3AD203B41FA5}">
                       <a16:colId xmlns:a16="http://schemas.microsoft.com/office/drawing/2014/main" val="1263998808"/>
                     </a:ext>
                   </a:extLst>
                 </a:gridCol>
-                <a:gridCol w="2566626">
+                <a:gridCol w="2955073">
                   <a:extLst>
                     <a:ext uri="{9D8B030D-6E8A-4147-A177-3AD203B41FA5}">
                       <a16:colId xmlns:a16="http://schemas.microsoft.com/office/drawing/2014/main" val="4097899022"/>
-                    </a:ext>
-                  </a:extLst>
-                </a:gridCol>
-                <a:gridCol w="1274349">
-                  <a:extLst>
-                    <a:ext uri="{9D8B030D-6E8A-4147-A177-3AD203B41FA5}">
-                      <a16:colId xmlns:a16="http://schemas.microsoft.com/office/drawing/2014/main" val="2615546019"/>
                     </a:ext>
                   </a:extLst>
                 </a:gridCol>
@@ -6423,8 +6411,10 @@
                         </a:lnSpc>
                       </a:pPr>
                       <a:r>
-                        <a:rPr lang="en-US" sz="1600" dirty="0"/>
-                        <a:t>Time (Eastern US)</a:t>
+                        <a:rPr lang="en-US" sz="1800" dirty="0">
+                          <a:latin typeface="+mn-lt"/>
+                        </a:rPr>
+                        <a:t>Time (MDT)</a:t>
                       </a:r>
                     </a:p>
                   </a:txBody>
@@ -6441,7 +6431,9 @@
                         </a:lnSpc>
                       </a:pPr>
                       <a:r>
-                        <a:rPr lang="en-US" sz="1600" dirty="0"/>
+                        <a:rPr lang="en-US" sz="1800" dirty="0">
+                          <a:latin typeface="+mn-lt"/>
+                        </a:rPr>
                         <a:t>Module</a:t>
                       </a:r>
                     </a:p>
@@ -6459,7 +6451,9 @@
                         </a:lnSpc>
                       </a:pPr>
                       <a:r>
-                        <a:rPr lang="en-US" sz="1600" dirty="0"/>
+                        <a:rPr lang="en-US" sz="1800" dirty="0">
+                          <a:latin typeface="+mn-lt"/>
+                        </a:rPr>
                         <a:t>Topic</a:t>
                       </a:r>
                     </a:p>
@@ -6477,26 +6471,10 @@
                         </a:lnSpc>
                       </a:pPr>
                       <a:r>
-                        <a:rPr lang="en-US" sz="1600" dirty="0"/>
+                        <a:rPr lang="en-US" sz="1800" dirty="0">
+                          <a:latin typeface="+mn-lt"/>
+                        </a:rPr>
                         <a:t>Speaker</a:t>
-                      </a:r>
-                    </a:p>
-                  </a:txBody>
-                  <a:tcPr/>
-                </a:tc>
-                <a:tc>
-                  <a:txBody>
-                    <a:bodyPr/>
-                    <a:lstStyle/>
-                    <a:p>
-                      <a:pPr>
-                        <a:lnSpc>
-                          <a:spcPct val="100000"/>
-                        </a:lnSpc>
-                      </a:pPr>
-                      <a:r>
-                        <a:rPr lang="en-US" sz="1600" dirty="0"/>
-                        <a:t>Time (UTC)</a:t>
                       </a:r>
                     </a:p>
                   </a:txBody>
@@ -6523,17 +6501,18 @@
                         </a:spcAft>
                       </a:pPr>
                       <a:r>
-                        <a:rPr lang="en-US" sz="1600" b="0" i="0" u="none" strike="noStrike" dirty="0">
+                        <a:rPr lang="en-US" sz="1800" b="0" i="0" u="none" strike="noStrike" dirty="0">
                           <a:solidFill>
                             <a:srgbClr val="000000"/>
                           </a:solidFill>
                           <a:effectLst/>
-                          <a:latin typeface="Arial" panose="020B0604020202020204" pitchFamily="34" charset="0"/>
+                          <a:latin typeface="+mn-lt"/>
                         </a:rPr>
-                        <a:t>2:30pm-2:35pm</a:t>
+                        <a:t>1:00pm-1:05pm</a:t>
                       </a:r>
-                      <a:endParaRPr lang="en-US" sz="3600" dirty="0">
+                      <a:endParaRPr lang="en-US" sz="1800" dirty="0">
                         <a:effectLst/>
+                        <a:latin typeface="+mn-lt"/>
                       </a:endParaRPr>
                     </a:p>
                   </a:txBody>
@@ -6550,7 +6529,9 @@
                         </a:lnSpc>
                       </a:pPr>
                       <a:r>
-                        <a:rPr lang="en-US" sz="1600" dirty="0"/>
+                        <a:rPr lang="en-US" sz="1800" dirty="0">
+                          <a:latin typeface="+mn-lt"/>
+                        </a:rPr>
                         <a:t>00</a:t>
                       </a:r>
                     </a:p>
@@ -6568,7 +6549,7 @@
                         </a:lnSpc>
                       </a:pPr>
                       <a:r>
-                        <a:rPr lang="en-US" sz="1600" b="0" i="0" u="none" strike="noStrike" kern="1200" dirty="0">
+                        <a:rPr lang="en-US" sz="1800" b="0" i="0" u="none" strike="noStrike" kern="1200" dirty="0">
                           <a:solidFill>
                             <a:schemeClr val="dk1"/>
                           </a:solidFill>
@@ -6579,7 +6560,9 @@
                         </a:rPr>
                         <a:t>Introduction</a:t>
                       </a:r>
-                      <a:endParaRPr lang="en-US" sz="1600" dirty="0"/>
+                      <a:endParaRPr lang="en-US" sz="1800" dirty="0">
+                        <a:latin typeface="+mn-lt"/>
+                      </a:endParaRPr>
                     </a:p>
                   </a:txBody>
                   <a:tcPr/>
@@ -6595,26 +6578,10 @@
                         </a:lnSpc>
                       </a:pPr>
                       <a:r>
-                        <a:rPr lang="en-US" sz="1600" dirty="0"/>
+                        <a:rPr lang="en-US" sz="1800" dirty="0">
+                          <a:latin typeface="+mn-lt"/>
+                        </a:rPr>
                         <a:t>David E. Bernholdt, ORNL</a:t>
-                      </a:r>
-                    </a:p>
-                  </a:txBody>
-                  <a:tcPr/>
-                </a:tc>
-                <a:tc>
-                  <a:txBody>
-                    <a:bodyPr/>
-                    <a:lstStyle/>
-                    <a:p>
-                      <a:pPr>
-                        <a:lnSpc>
-                          <a:spcPct val="100000"/>
-                        </a:lnSpc>
-                      </a:pPr>
-                      <a:r>
-                        <a:rPr lang="en-US" sz="1600" dirty="0"/>
-                        <a:t>19:30-19:35</a:t>
                       </a:r>
                     </a:p>
                   </a:txBody>
@@ -6641,17 +6608,18 @@
                         </a:spcAft>
                       </a:pPr>
                       <a:r>
-                        <a:rPr lang="en-US" sz="1600" b="0" i="0" u="none" strike="noStrike" dirty="0">
+                        <a:rPr lang="en-US" sz="1800" b="0" i="0" u="none" strike="noStrike" dirty="0">
                           <a:solidFill>
                             <a:srgbClr val="000000"/>
                           </a:solidFill>
                           <a:effectLst/>
-                          <a:latin typeface="Arial" panose="020B0604020202020204" pitchFamily="34" charset="0"/>
+                          <a:latin typeface="+mn-lt"/>
                         </a:rPr>
-                        <a:t>2:35pm-2:45pm</a:t>
+                        <a:t>1:05pm-1:15pm</a:t>
                       </a:r>
-                      <a:endParaRPr lang="en-US" sz="3600" dirty="0">
+                      <a:endParaRPr lang="en-US" sz="1800" dirty="0">
                         <a:effectLst/>
+                        <a:latin typeface="+mn-lt"/>
                       </a:endParaRPr>
                     </a:p>
                   </a:txBody>
@@ -6680,7 +6648,9 @@
                         <a:defRPr/>
                       </a:pPr>
                       <a:r>
-                        <a:rPr lang="en-US" sz="1600" dirty="0"/>
+                        <a:rPr lang="en-US" sz="1800" dirty="0">
+                          <a:latin typeface="+mn-lt"/>
+                        </a:rPr>
                         <a:t>01</a:t>
                       </a:r>
                     </a:p>
@@ -6710,7 +6680,7 @@
                         <a:defRPr/>
                       </a:pPr>
                       <a:r>
-                        <a:rPr lang="en-US" sz="1600" b="0" i="0" u="none" strike="noStrike" kern="1200" dirty="0">
+                        <a:rPr lang="en-US" sz="1800" b="0" i="0" u="none" strike="noStrike" kern="1200" dirty="0">
                           <a:solidFill>
                             <a:schemeClr val="dk1"/>
                           </a:solidFill>
@@ -6721,7 +6691,9 @@
                         </a:rPr>
                         <a:t>Motivation and Overview of Best Practices in HPC Software Development</a:t>
                       </a:r>
-                      <a:endParaRPr lang="en-US" sz="1600" dirty="0"/>
+                      <a:endParaRPr lang="en-US" sz="1800" dirty="0">
+                        <a:latin typeface="+mn-lt"/>
+                      </a:endParaRPr>
                     </a:p>
                   </a:txBody>
                   <a:tcPr/>
@@ -6749,38 +6721,10 @@
                         <a:defRPr/>
                       </a:pPr>
                       <a:r>
-                        <a:rPr lang="en-US" sz="1600" dirty="0"/>
+                        <a:rPr lang="en-US" sz="1800" dirty="0">
+                          <a:latin typeface="+mn-lt"/>
+                        </a:rPr>
                         <a:t>David E. Bernholdt, ORNL</a:t>
-                      </a:r>
-                    </a:p>
-                  </a:txBody>
-                  <a:tcPr/>
-                </a:tc>
-                <a:tc>
-                  <a:txBody>
-                    <a:bodyPr/>
-                    <a:lstStyle/>
-                    <a:p>
-                      <a:pPr marL="0" marR="0" lvl="0" indent="0" algn="l" defTabSz="914400" rtl="0" eaLnBrk="1" fontAlgn="auto" latinLnBrk="0" hangingPunct="1">
-                        <a:lnSpc>
-                          <a:spcPct val="100000"/>
-                        </a:lnSpc>
-                        <a:spcBef>
-                          <a:spcPts val="0"/>
-                        </a:spcBef>
-                        <a:spcAft>
-                          <a:spcPts val="0"/>
-                        </a:spcAft>
-                        <a:buClrTx/>
-                        <a:buSzTx/>
-                        <a:buFontTx/>
-                        <a:buNone/>
-                        <a:tabLst/>
-                        <a:defRPr/>
-                      </a:pPr>
-                      <a:r>
-                        <a:rPr lang="en-US" sz="1600" dirty="0"/>
-                        <a:t>19:35-19:45</a:t>
                       </a:r>
                     </a:p>
                   </a:txBody>
@@ -6807,17 +6751,18 @@
                         </a:spcAft>
                       </a:pPr>
                       <a:r>
-                        <a:rPr lang="en-US" sz="1600" b="0" i="0" u="none" strike="noStrike" dirty="0">
+                        <a:rPr lang="en-US" sz="1800" b="0" i="0" u="none" strike="noStrike" dirty="0">
                           <a:solidFill>
                             <a:srgbClr val="000000"/>
                           </a:solidFill>
                           <a:effectLst/>
-                          <a:latin typeface="Arial" panose="020B0604020202020204" pitchFamily="34" charset="0"/>
+                          <a:latin typeface="+mn-lt"/>
                         </a:rPr>
-                        <a:t>2:45pm-3:15pm</a:t>
+                        <a:t>1:15pm-1:45pm</a:t>
                       </a:r>
-                      <a:endParaRPr lang="en-US" sz="3600" dirty="0">
+                      <a:endParaRPr lang="en-US" sz="1800" dirty="0">
                         <a:effectLst/>
+                        <a:latin typeface="+mn-lt"/>
                       </a:endParaRPr>
                     </a:p>
                   </a:txBody>
@@ -6834,7 +6779,9 @@
                         </a:lnSpc>
                       </a:pPr>
                       <a:r>
-                        <a:rPr lang="en-US" sz="1600" dirty="0"/>
+                        <a:rPr lang="en-US" sz="1800" dirty="0">
+                          <a:latin typeface="+mn-lt"/>
+                        </a:rPr>
                         <a:t>02</a:t>
                       </a:r>
                     </a:p>
@@ -6852,7 +6799,9 @@
                         </a:lnSpc>
                       </a:pPr>
                       <a:r>
-                        <a:rPr lang="en-US" sz="1600" dirty="0"/>
+                        <a:rPr lang="en-US" sz="1800" dirty="0">
+                          <a:latin typeface="+mn-lt"/>
+                        </a:rPr>
                         <a:t>Agile Methodologies</a:t>
                       </a:r>
                     </a:p>
@@ -6870,26 +6819,10 @@
                         </a:lnSpc>
                       </a:pPr>
                       <a:r>
-                        <a:rPr lang="en-US" sz="1600" dirty="0"/>
-                        <a:t>Rinku Gupta, ANL</a:t>
-                      </a:r>
-                    </a:p>
-                  </a:txBody>
-                  <a:tcPr/>
-                </a:tc>
-                <a:tc>
-                  <a:txBody>
-                    <a:bodyPr/>
-                    <a:lstStyle/>
-                    <a:p>
-                      <a:pPr>
-                        <a:lnSpc>
-                          <a:spcPct val="100000"/>
-                        </a:lnSpc>
-                      </a:pPr>
-                      <a:r>
-                        <a:rPr lang="en-US" sz="1600" dirty="0"/>
-                        <a:t>19:45-20:15</a:t>
+                        <a:rPr lang="en-US" sz="1800" dirty="0">
+                          <a:latin typeface="+mn-lt"/>
+                        </a:rPr>
+                        <a:t>Rinku K. Gupta, ANL</a:t>
                       </a:r>
                     </a:p>
                   </a:txBody>
@@ -6916,10 +6849,11 @@
                         </a:spcAft>
                       </a:pPr>
                       <a:r>
-                        <a:rPr lang="en-US" sz="1600" dirty="0">
+                        <a:rPr lang="en-US" sz="1800" dirty="0">
                           <a:effectLst/>
+                          <a:latin typeface="+mn-lt"/>
                         </a:rPr>
-                        <a:t>3:15pm-3:30pm</a:t>
+                        <a:t>1:45pm-2:00pm</a:t>
                       </a:r>
                     </a:p>
                   </a:txBody>
@@ -6936,10 +6870,11 @@
                         </a:lnSpc>
                       </a:pPr>
                       <a:r>
-                        <a:rPr lang="en-US" sz="1600" i="0" dirty="0">
+                        <a:rPr lang="en-US" sz="1800" i="0" dirty="0">
                           <a:solidFill>
                             <a:schemeClr val="tx1"/>
                           </a:solidFill>
+                          <a:latin typeface="+mn-lt"/>
                         </a:rPr>
                         <a:t>03</a:t>
                       </a:r>
@@ -6970,7 +6905,7 @@
                         <a:defRPr/>
                       </a:pPr>
                       <a:r>
-                        <a:rPr lang="en-US" sz="1600" b="0" i="0" u="none" strike="noStrike" kern="1200" dirty="0">
+                        <a:rPr lang="en-US" sz="1800" b="0" i="0" u="none" strike="noStrike" kern="1200" dirty="0">
                           <a:solidFill>
                             <a:schemeClr val="dk1"/>
                           </a:solidFill>
@@ -6981,7 +6916,9 @@
                         </a:rPr>
                         <a:t>Git Workflows</a:t>
                       </a:r>
-                      <a:endParaRPr lang="en-US" sz="1600" dirty="0"/>
+                      <a:endParaRPr lang="en-US" sz="1800" dirty="0">
+                        <a:latin typeface="+mn-lt"/>
+                      </a:endParaRPr>
                     </a:p>
                   </a:txBody>
                   <a:tcPr/>
@@ -6997,26 +6934,10 @@
                         </a:lnSpc>
                       </a:pPr>
                       <a:r>
-                        <a:rPr lang="en-US" sz="1600" dirty="0"/>
-                        <a:t>Patricia Grubel, LANL</a:t>
-                      </a:r>
-                    </a:p>
-                  </a:txBody>
-                  <a:tcPr/>
-                </a:tc>
-                <a:tc>
-                  <a:txBody>
-                    <a:bodyPr/>
-                    <a:lstStyle/>
-                    <a:p>
-                      <a:pPr>
-                        <a:lnSpc>
-                          <a:spcPct val="100000"/>
-                        </a:lnSpc>
-                      </a:pPr>
-                      <a:r>
-                        <a:rPr lang="en-US" sz="1600" dirty="0"/>
-                        <a:t>20:15-20:30</a:t>
+                        <a:rPr lang="en-US" sz="1800" dirty="0">
+                          <a:latin typeface="+mn-lt"/>
+                        </a:rPr>
+                        <a:t>Rinku K. Gupta, ANL</a:t>
                       </a:r>
                     </a:p>
                   </a:txBody>
@@ -7043,20 +6964,21 @@
                         </a:spcAft>
                       </a:pPr>
                       <a:r>
-                        <a:rPr lang="en-US" sz="1600" b="0" i="0" u="none" strike="noStrike" dirty="0">
+                        <a:rPr lang="en-US" sz="1800" b="0" i="0" u="none" strike="noStrike" dirty="0">
                           <a:solidFill>
                             <a:schemeClr val="tx1"/>
                           </a:solidFill>
                           <a:effectLst/>
-                          <a:latin typeface="Arial" panose="020B0604020202020204" pitchFamily="34" charset="0"/>
+                          <a:latin typeface="+mn-lt"/>
                         </a:rPr>
-                        <a:t>3:30pm-4:00pm</a:t>
+                        <a:t>2:00pm-2:20pm</a:t>
                       </a:r>
-                      <a:endParaRPr lang="en-US" sz="3600" i="0" dirty="0">
+                      <a:endParaRPr lang="en-US" sz="1800" i="0" dirty="0">
                         <a:solidFill>
                           <a:schemeClr val="tx1"/>
                         </a:solidFill>
                         <a:effectLst/>
+                        <a:latin typeface="+mn-lt"/>
                       </a:endParaRPr>
                     </a:p>
                   </a:txBody>
@@ -7073,164 +6995,13 @@
                         </a:lnSpc>
                       </a:pPr>
                       <a:r>
-                        <a:rPr lang="en-US" sz="1600" i="0" dirty="0">
+                        <a:rPr lang="en-US" sz="1800" i="0" dirty="0">
                           <a:solidFill>
                             <a:schemeClr val="tx1"/>
                           </a:solidFill>
+                          <a:latin typeface="+mn-lt"/>
                         </a:rPr>
                         <a:t>04</a:t>
-                      </a:r>
-                    </a:p>
-                  </a:txBody>
-                  <a:tcPr/>
-                </a:tc>
-                <a:tc>
-                  <a:txBody>
-                    <a:bodyPr/>
-                    <a:lstStyle/>
-                    <a:p>
-                      <a:pPr>
-                        <a:lnSpc>
-                          <a:spcPct val="100000"/>
-                        </a:lnSpc>
-                      </a:pPr>
-                      <a:r>
-                        <a:rPr lang="en-US" sz="1600" b="0" i="0" u="none" strike="noStrike" kern="1200" dirty="0">
-                          <a:solidFill>
-                            <a:schemeClr val="tx1"/>
-                          </a:solidFill>
-                          <a:effectLst/>
-                          <a:latin typeface="+mn-lt"/>
-                          <a:ea typeface="+mn-ea"/>
-                          <a:cs typeface="+mn-cs"/>
-                        </a:rPr>
-                        <a:t>Software Design</a:t>
-                      </a:r>
-                      <a:endParaRPr lang="en-US" sz="1600" i="0" dirty="0">
-                        <a:solidFill>
-                          <a:schemeClr val="tx1"/>
-                        </a:solidFill>
-                      </a:endParaRPr>
-                    </a:p>
-                  </a:txBody>
-                  <a:tcPr/>
-                </a:tc>
-                <a:tc>
-                  <a:txBody>
-                    <a:bodyPr/>
-                    <a:lstStyle/>
-                    <a:p>
-                      <a:pPr>
-                        <a:lnSpc>
-                          <a:spcPct val="100000"/>
-                        </a:lnSpc>
-                      </a:pPr>
-                      <a:r>
-                        <a:rPr lang="en-US" sz="1600" i="0" dirty="0">
-                          <a:solidFill>
-                            <a:schemeClr val="tx1"/>
-                          </a:solidFill>
-                        </a:rPr>
-                        <a:t>Anshu Dubey, ANL</a:t>
-                      </a:r>
-                    </a:p>
-                  </a:txBody>
-                  <a:tcPr/>
-                </a:tc>
-                <a:tc>
-                  <a:txBody>
-                    <a:bodyPr/>
-                    <a:lstStyle/>
-                    <a:p>
-                      <a:pPr>
-                        <a:lnSpc>
-                          <a:spcPct val="100000"/>
-                        </a:lnSpc>
-                      </a:pPr>
-                      <a:r>
-                        <a:rPr lang="en-US" sz="1600" i="0" dirty="0">
-                          <a:solidFill>
-                            <a:schemeClr val="tx1"/>
-                          </a:solidFill>
-                        </a:rPr>
-                        <a:t>20:30-21:00</a:t>
-                      </a:r>
-                    </a:p>
-                  </a:txBody>
-                  <a:tcPr/>
-                </a:tc>
-                <a:extLst>
-                  <a:ext uri="{0D108BD9-81ED-4DB2-BD59-A6C34878D82A}">
-                    <a16:rowId xmlns:a16="http://schemas.microsoft.com/office/drawing/2014/main" val="1922613886"/>
-                  </a:ext>
-                </a:extLst>
-              </a:tr>
-              <a:tr h="370840">
-                <a:tc>
-                  <a:txBody>
-                    <a:bodyPr/>
-                    <a:lstStyle/>
-                    <a:p>
-                      <a:pPr rtl="0" fontAlgn="t">
-                        <a:spcBef>
-                          <a:spcPts val="0"/>
-                        </a:spcBef>
-                        <a:spcAft>
-                          <a:spcPts val="0"/>
-                        </a:spcAft>
-                      </a:pPr>
-                      <a:r>
-                        <a:rPr lang="en-US" sz="1600" i="0" dirty="0">
-                          <a:solidFill>
-                            <a:schemeClr val="tx1"/>
-                          </a:solidFill>
-                          <a:effectLst/>
-                        </a:rPr>
-                        <a:t>4:00pm-4:15pm</a:t>
-                      </a:r>
-                    </a:p>
-                  </a:txBody>
-                  <a:tcPr marL="63500" marR="63500" marT="63500" marB="63500"/>
-                </a:tc>
-                <a:tc>
-                  <a:txBody>
-                    <a:bodyPr/>
-                    <a:lstStyle/>
-                    <a:p>
-                      <a:pPr>
-                        <a:lnSpc>
-                          <a:spcPct val="100000"/>
-                        </a:lnSpc>
-                      </a:pPr>
-                      <a:r>
-                        <a:rPr lang="en-US" sz="1600" i="0" dirty="0">
-                          <a:solidFill>
-                            <a:schemeClr val="tx1"/>
-                          </a:solidFill>
-                        </a:rPr>
-                        <a:t>05</a:t>
-                      </a:r>
-                    </a:p>
-                  </a:txBody>
-                  <a:tcPr/>
-                </a:tc>
-                <a:tc>
-                  <a:txBody>
-                    <a:bodyPr/>
-                    <a:lstStyle/>
-                    <a:p>
-                      <a:pPr>
-                        <a:lnSpc>
-                          <a:spcPct val="100000"/>
-                        </a:lnSpc>
-                      </a:pPr>
-                      <a:r>
-                        <a:rPr lang="en-US" sz="1600" i="0" dirty="0">
-                          <a:solidFill>
-                            <a:schemeClr val="tx1"/>
-                          </a:solidFill>
-                        </a:rPr>
-                        <a:t>Software Testing 1</a:t>
                       </a:r>
                     </a:p>
                   </a:txBody>
@@ -7259,12 +7030,201 @@
                         <a:defRPr/>
                       </a:pPr>
                       <a:r>
-                        <a:rPr lang="en-US" sz="1600" i="0" dirty="0">
+                        <a:rPr lang="en-US" sz="1800" i="0" dirty="0">
                           <a:solidFill>
                             <a:schemeClr val="tx1"/>
                           </a:solidFill>
+                          <a:latin typeface="+mn-lt"/>
                         </a:rPr>
-                        <a:t>Rinku Gupta, ANL</a:t>
+                        <a:t>Software Testing 1</a:t>
+                      </a:r>
+                    </a:p>
+                  </a:txBody>
+                  <a:tcPr/>
+                </a:tc>
+                <a:tc>
+                  <a:txBody>
+                    <a:bodyPr/>
+                    <a:lstStyle/>
+                    <a:p>
+                      <a:pPr>
+                        <a:lnSpc>
+                          <a:spcPct val="100000"/>
+                        </a:lnSpc>
+                      </a:pPr>
+                      <a:r>
+                        <a:rPr lang="en-US" sz="1800" i="0" dirty="0">
+                          <a:solidFill>
+                            <a:schemeClr val="tx1"/>
+                          </a:solidFill>
+                          <a:latin typeface="+mn-lt"/>
+                        </a:rPr>
+                        <a:t>David M. Rogers, ORNL</a:t>
+                      </a:r>
+                    </a:p>
+                  </a:txBody>
+                  <a:tcPr/>
+                </a:tc>
+                <a:extLst>
+                  <a:ext uri="{0D108BD9-81ED-4DB2-BD59-A6C34878D82A}">
+                    <a16:rowId xmlns:a16="http://schemas.microsoft.com/office/drawing/2014/main" val="1922613886"/>
+                  </a:ext>
+                </a:extLst>
+              </a:tr>
+              <a:tr h="370840">
+                <a:tc>
+                  <a:txBody>
+                    <a:bodyPr/>
+                    <a:lstStyle/>
+                    <a:p>
+                      <a:pPr rtl="0" fontAlgn="t">
+                        <a:spcBef>
+                          <a:spcPts val="0"/>
+                        </a:spcBef>
+                        <a:spcAft>
+                          <a:spcPts val="0"/>
+                        </a:spcAft>
+                      </a:pPr>
+                      <a:r>
+                        <a:rPr lang="en-US" sz="1800" b="0" i="1" u="none" strike="noStrike" dirty="0">
+                          <a:solidFill>
+                            <a:schemeClr val="tx2"/>
+                          </a:solidFill>
+                          <a:effectLst/>
+                          <a:latin typeface="+mn-lt"/>
+                        </a:rPr>
+                        <a:t>2:20pm-2:40pm</a:t>
+                      </a:r>
+                      <a:endParaRPr lang="en-US" sz="1800" i="1" dirty="0">
+                        <a:solidFill>
+                          <a:schemeClr val="tx2"/>
+                        </a:solidFill>
+                        <a:effectLst/>
+                        <a:latin typeface="+mn-lt"/>
+                      </a:endParaRPr>
+                    </a:p>
+                  </a:txBody>
+                  <a:tcPr marL="63500" marR="63500" marT="63500" marB="63500"/>
+                </a:tc>
+                <a:tc>
+                  <a:txBody>
+                    <a:bodyPr/>
+                    <a:lstStyle/>
+                    <a:p>
+                      <a:pPr>
+                        <a:lnSpc>
+                          <a:spcPct val="100000"/>
+                        </a:lnSpc>
+                      </a:pPr>
+                      <a:endParaRPr lang="en-US" sz="1800" i="1" dirty="0">
+                        <a:solidFill>
+                          <a:schemeClr val="tx2"/>
+                        </a:solidFill>
+                        <a:latin typeface="+mn-lt"/>
+                      </a:endParaRPr>
+                    </a:p>
+                  </a:txBody>
+                  <a:tcPr/>
+                </a:tc>
+                <a:tc>
+                  <a:txBody>
+                    <a:bodyPr/>
+                    <a:lstStyle/>
+                    <a:p>
+                      <a:pPr>
+                        <a:lnSpc>
+                          <a:spcPct val="100000"/>
+                        </a:lnSpc>
+                      </a:pPr>
+                      <a:r>
+                        <a:rPr lang="en-US" sz="1800" i="1" dirty="0">
+                          <a:solidFill>
+                            <a:schemeClr val="tx2"/>
+                          </a:solidFill>
+                          <a:latin typeface="+mn-lt"/>
+                        </a:rPr>
+                        <a:t>Break (optional Q&amp;A)</a:t>
+                      </a:r>
+                    </a:p>
+                  </a:txBody>
+                  <a:tcPr/>
+                </a:tc>
+                <a:tc>
+                  <a:txBody>
+                    <a:bodyPr/>
+                    <a:lstStyle/>
+                    <a:p>
+                      <a:pPr>
+                        <a:lnSpc>
+                          <a:spcPct val="100000"/>
+                        </a:lnSpc>
+                      </a:pPr>
+                      <a:r>
+                        <a:rPr lang="en-US" sz="1800" i="1" dirty="0">
+                          <a:solidFill>
+                            <a:schemeClr val="tx2"/>
+                          </a:solidFill>
+                          <a:latin typeface="+mn-lt"/>
+                        </a:rPr>
+                        <a:t>All</a:t>
+                      </a:r>
+                    </a:p>
+                  </a:txBody>
+                  <a:tcPr/>
+                </a:tc>
+                <a:extLst>
+                  <a:ext uri="{0D108BD9-81ED-4DB2-BD59-A6C34878D82A}">
+                    <a16:rowId xmlns:a16="http://schemas.microsoft.com/office/drawing/2014/main" val="4193880066"/>
+                  </a:ext>
+                </a:extLst>
+              </a:tr>
+              <a:tr h="370840">
+                <a:tc>
+                  <a:txBody>
+                    <a:bodyPr/>
+                    <a:lstStyle/>
+                    <a:p>
+                      <a:pPr rtl="0" fontAlgn="t">
+                        <a:spcBef>
+                          <a:spcPts val="0"/>
+                        </a:spcBef>
+                        <a:spcAft>
+                          <a:spcPts val="0"/>
+                        </a:spcAft>
+                      </a:pPr>
+                      <a:r>
+                        <a:rPr lang="en-US" sz="1800" b="0" i="0" u="none" strike="noStrike" dirty="0">
+                          <a:solidFill>
+                            <a:srgbClr val="000000"/>
+                          </a:solidFill>
+                          <a:effectLst/>
+                          <a:latin typeface="+mn-lt"/>
+                        </a:rPr>
+                        <a:t>2:40pm-3:00pm</a:t>
+                      </a:r>
+                      <a:endParaRPr lang="en-US" sz="1800" dirty="0">
+                        <a:effectLst/>
+                        <a:latin typeface="+mn-lt"/>
+                      </a:endParaRPr>
+                    </a:p>
+                  </a:txBody>
+                  <a:tcPr marL="63500" marR="63500" marT="63500" marB="63500"/>
+                </a:tc>
+                <a:tc>
+                  <a:txBody>
+                    <a:bodyPr/>
+                    <a:lstStyle/>
+                    <a:p>
+                      <a:pPr>
+                        <a:lnSpc>
+                          <a:spcPct val="100000"/>
+                        </a:lnSpc>
+                      </a:pPr>
+                      <a:r>
+                        <a:rPr lang="en-US" sz="1800" i="0" dirty="0">
+                          <a:latin typeface="+mn-lt"/>
+                        </a:rPr>
+                        <a:t>05</a:t>
                       </a:r>
                     </a:p>
                   </a:txBody>
@@ -7293,93 +7253,16 @@
                         <a:defRPr/>
                       </a:pPr>
                       <a:r>
-                        <a:rPr lang="en-US" sz="1600" i="0" dirty="0">
+                        <a:rPr lang="en-US" sz="1800" b="0" i="0" u="none" strike="noStrike" kern="1200" dirty="0">
                           <a:solidFill>
                             <a:schemeClr val="tx1"/>
                           </a:solidFill>
+                          <a:effectLst/>
+                          <a:latin typeface="+mn-lt"/>
+                          <a:ea typeface="+mn-ea"/>
+                          <a:cs typeface="+mn-cs"/>
                         </a:rPr>
-                        <a:t>21:00-21:15</a:t>
-                      </a:r>
-                    </a:p>
-                  </a:txBody>
-                  <a:tcPr/>
-                </a:tc>
-                <a:extLst>
-                  <a:ext uri="{0D108BD9-81ED-4DB2-BD59-A6C34878D82A}">
-                    <a16:rowId xmlns:a16="http://schemas.microsoft.com/office/drawing/2014/main" val="3073672808"/>
-                  </a:ext>
-                </a:extLst>
-              </a:tr>
-              <a:tr h="370840">
-                <a:tc>
-                  <a:txBody>
-                    <a:bodyPr/>
-                    <a:lstStyle/>
-                    <a:p>
-                      <a:pPr rtl="0" fontAlgn="t">
-                        <a:spcBef>
-                          <a:spcPts val="0"/>
-                        </a:spcBef>
-                        <a:spcAft>
-                          <a:spcPts val="0"/>
-                        </a:spcAft>
-                      </a:pPr>
-                      <a:r>
-                        <a:rPr lang="en-US" sz="1600" b="0" i="1" u="none" strike="noStrike" dirty="0">
-                          <a:solidFill>
-                            <a:schemeClr val="tx2"/>
-                          </a:solidFill>
-                          <a:effectLst/>
-                          <a:latin typeface="Arial" panose="020B0604020202020204" pitchFamily="34" charset="0"/>
-                        </a:rPr>
-                        <a:t>4:15pm-4:35pm</a:t>
-                      </a:r>
-                      <a:endParaRPr lang="en-US" sz="3600" i="1" dirty="0">
-                        <a:solidFill>
-                          <a:schemeClr val="tx2"/>
-                        </a:solidFill>
-                        <a:effectLst/>
-                      </a:endParaRPr>
-                    </a:p>
-                  </a:txBody>
-                  <a:tcPr marL="63500" marR="63500" marT="63500" marB="63500"/>
-                </a:tc>
-                <a:tc>
-                  <a:txBody>
-                    <a:bodyPr/>
-                    <a:lstStyle/>
-                    <a:p>
-                      <a:pPr>
-                        <a:lnSpc>
-                          <a:spcPct val="100000"/>
-                        </a:lnSpc>
-                      </a:pPr>
-                      <a:endParaRPr lang="en-US" sz="1600" i="1" dirty="0">
-                        <a:solidFill>
-                          <a:schemeClr val="tx2"/>
-                        </a:solidFill>
-                      </a:endParaRPr>
-                    </a:p>
-                  </a:txBody>
-                  <a:tcPr/>
-                </a:tc>
-                <a:tc>
-                  <a:txBody>
-                    <a:bodyPr/>
-                    <a:lstStyle/>
-                    <a:p>
-                      <a:pPr>
-                        <a:lnSpc>
-                          <a:spcPct val="100000"/>
-                        </a:lnSpc>
-                      </a:pPr>
-                      <a:r>
-                        <a:rPr lang="en-US" sz="1600" i="1" dirty="0">
-                          <a:solidFill>
-                            <a:schemeClr val="tx2"/>
-                          </a:solidFill>
-                        </a:rPr>
-                        <a:t>Break (live Q&amp;A and demo of Kanban hands-on activities)</a:t>
+                        <a:t>Software Design</a:t>
                       </a:r>
                     </a:p>
                   </a:txBody>
@@ -7396,143 +7279,10 @@
                         </a:lnSpc>
                       </a:pPr>
                       <a:r>
-                        <a:rPr lang="en-US" sz="1600" i="1" dirty="0">
-                          <a:solidFill>
-                            <a:schemeClr val="tx2"/>
-                          </a:solidFill>
+                        <a:rPr lang="en-US" sz="1800" dirty="0">
+                          <a:latin typeface="+mn-lt"/>
                         </a:rPr>
-                        <a:t>David E. Bernholdt and All</a:t>
-                      </a:r>
-                    </a:p>
-                  </a:txBody>
-                  <a:tcPr/>
-                </a:tc>
-                <a:tc>
-                  <a:txBody>
-                    <a:bodyPr/>
-                    <a:lstStyle/>
-                    <a:p>
-                      <a:pPr>
-                        <a:lnSpc>
-                          <a:spcPct val="100000"/>
-                        </a:lnSpc>
-                      </a:pPr>
-                      <a:r>
-                        <a:rPr lang="en-US" sz="1600" i="1" dirty="0">
-                          <a:solidFill>
-                            <a:schemeClr val="tx2"/>
-                          </a:solidFill>
-                        </a:rPr>
-                        <a:t>21:15-21:35</a:t>
-                      </a:r>
-                    </a:p>
-                  </a:txBody>
-                  <a:tcPr/>
-                </a:tc>
-                <a:extLst>
-                  <a:ext uri="{0D108BD9-81ED-4DB2-BD59-A6C34878D82A}">
-                    <a16:rowId xmlns:a16="http://schemas.microsoft.com/office/drawing/2014/main" val="4193880066"/>
-                  </a:ext>
-                </a:extLst>
-              </a:tr>
-              <a:tr h="370840">
-                <a:tc>
-                  <a:txBody>
-                    <a:bodyPr/>
-                    <a:lstStyle/>
-                    <a:p>
-                      <a:pPr rtl="0" fontAlgn="t">
-                        <a:spcBef>
-                          <a:spcPts val="0"/>
-                        </a:spcBef>
-                        <a:spcAft>
-                          <a:spcPts val="0"/>
-                        </a:spcAft>
-                      </a:pPr>
-                      <a:r>
-                        <a:rPr lang="en-US" sz="1600" b="0" i="0" u="none" strike="noStrike" dirty="0">
-                          <a:solidFill>
-                            <a:srgbClr val="000000"/>
-                          </a:solidFill>
-                          <a:effectLst/>
-                          <a:latin typeface="Arial" panose="020B0604020202020204" pitchFamily="34" charset="0"/>
-                        </a:rPr>
-                        <a:t>4:35pm-4:50pm</a:t>
-                      </a:r>
-                      <a:endParaRPr lang="en-US" sz="3600" dirty="0">
-                        <a:effectLst/>
-                      </a:endParaRPr>
-                    </a:p>
-                  </a:txBody>
-                  <a:tcPr marL="63500" marR="63500" marT="63500" marB="63500"/>
-                </a:tc>
-                <a:tc>
-                  <a:txBody>
-                    <a:bodyPr/>
-                    <a:lstStyle/>
-                    <a:p>
-                      <a:pPr>
-                        <a:lnSpc>
-                          <a:spcPct val="100000"/>
-                        </a:lnSpc>
-                      </a:pPr>
-                      <a:r>
-                        <a:rPr lang="en-US" sz="1600" i="0" dirty="0"/>
-                        <a:t>06</a:t>
-                      </a:r>
-                    </a:p>
-                  </a:txBody>
-                  <a:tcPr/>
-                </a:tc>
-                <a:tc>
-                  <a:txBody>
-                    <a:bodyPr/>
-                    <a:lstStyle/>
-                    <a:p>
-                      <a:pPr>
-                        <a:lnSpc>
-                          <a:spcPct val="100000"/>
-                        </a:lnSpc>
-                      </a:pPr>
-                      <a:r>
-                        <a:rPr lang="en-US" sz="1600" i="0" dirty="0"/>
-                        <a:t>Software Testing 2</a:t>
-                      </a:r>
-                    </a:p>
-                  </a:txBody>
-                  <a:tcPr/>
-                </a:tc>
-                <a:tc>
-                  <a:txBody>
-                    <a:bodyPr/>
-                    <a:lstStyle/>
-                    <a:p>
-                      <a:pPr>
-                        <a:lnSpc>
-                          <a:spcPct val="100000"/>
-                        </a:lnSpc>
-                      </a:pPr>
-                      <a:r>
-                        <a:rPr lang="en-US" sz="1600" dirty="0"/>
                         <a:t>Anshu Dubey, ANL</a:t>
-                      </a:r>
-                    </a:p>
-                  </a:txBody>
-                  <a:tcPr/>
-                </a:tc>
-                <a:tc>
-                  <a:txBody>
-                    <a:bodyPr/>
-                    <a:lstStyle/>
-                    <a:p>
-                      <a:pPr>
-                        <a:lnSpc>
-                          <a:spcPct val="100000"/>
-                        </a:lnSpc>
-                      </a:pPr>
-                      <a:r>
-                        <a:rPr lang="en-US" sz="1600" dirty="0"/>
-                        <a:t>21:35-21:50</a:t>
                       </a:r>
                     </a:p>
                   </a:txBody>
@@ -7559,10 +7309,11 @@
                         </a:spcAft>
                       </a:pPr>
                       <a:r>
-                        <a:rPr lang="en-US" sz="1600" dirty="0">
+                        <a:rPr lang="en-US" sz="1800" dirty="0">
                           <a:effectLst/>
+                          <a:latin typeface="+mn-lt"/>
                         </a:rPr>
-                        <a:t>4:50pm-5:35pm</a:t>
+                        <a:t>3:00pm-3:15pm</a:t>
                       </a:r>
                     </a:p>
                   </a:txBody>
@@ -7579,8 +7330,10 @@
                         </a:lnSpc>
                       </a:pPr>
                       <a:r>
-                        <a:rPr lang="en-US" sz="1600" i="0" dirty="0"/>
-                        <a:t>07</a:t>
+                        <a:rPr lang="en-US" sz="1800" i="0" dirty="0">
+                          <a:latin typeface="+mn-lt"/>
+                        </a:rPr>
+                        <a:t>06</a:t>
                       </a:r>
                     </a:p>
                   </a:txBody>
@@ -7597,8 +7350,10 @@
                         </a:lnSpc>
                       </a:pPr>
                       <a:r>
-                        <a:rPr lang="en-US" sz="1600" i="0" dirty="0"/>
-                        <a:t>Refactoring</a:t>
+                        <a:rPr lang="en-US" sz="1800" i="0" dirty="0">
+                          <a:latin typeface="+mn-lt"/>
+                        </a:rPr>
+                        <a:t>Software Testing 2</a:t>
                       </a:r>
                     </a:p>
                   </a:txBody>
@@ -7627,46 +7382,13 @@
                         <a:defRPr/>
                       </a:pPr>
                       <a:r>
-                        <a:rPr lang="en-US" sz="1600" i="0" dirty="0">
+                        <a:rPr lang="en-US" sz="1800" i="0" dirty="0">
                           <a:solidFill>
                             <a:schemeClr val="tx1"/>
                           </a:solidFill>
+                          <a:latin typeface="+mn-lt"/>
                         </a:rPr>
-                        <a:t>Anshu Dubey, ANL</a:t>
-                      </a:r>
-                    </a:p>
-                  </a:txBody>
-                  <a:tcPr/>
-                </a:tc>
-                <a:tc>
-                  <a:txBody>
-                    <a:bodyPr/>
-                    <a:lstStyle/>
-                    <a:p>
-                      <a:pPr marL="0" marR="0" lvl="0" indent="0" algn="l" defTabSz="914400" rtl="0" eaLnBrk="1" fontAlgn="auto" latinLnBrk="0" hangingPunct="1">
-                        <a:lnSpc>
-                          <a:spcPct val="100000"/>
-                        </a:lnSpc>
-                        <a:spcBef>
-                          <a:spcPts val="0"/>
-                        </a:spcBef>
-                        <a:spcAft>
-                          <a:spcPts val="0"/>
-                        </a:spcAft>
-                        <a:buClrTx/>
-                        <a:buSzTx/>
-                        <a:buFontTx/>
-                        <a:buNone/>
-                        <a:tabLst/>
-                        <a:defRPr/>
-                      </a:pPr>
-                      <a:r>
-                        <a:rPr lang="en-US" sz="1600" i="0" dirty="0">
-                          <a:solidFill>
-                            <a:schemeClr val="tx1"/>
-                          </a:solidFill>
-                        </a:rPr>
-                        <a:t>21:50-22:35</a:t>
+                        <a:t>David M. Rogers</a:t>
                       </a:r>
                     </a:p>
                   </a:txBody>
@@ -7693,10 +7415,11 @@
                         </a:spcAft>
                       </a:pPr>
                       <a:r>
-                        <a:rPr lang="en-US" sz="1600" dirty="0">
+                        <a:rPr lang="en-US" sz="1800" dirty="0">
                           <a:effectLst/>
+                          <a:latin typeface="+mn-lt"/>
                         </a:rPr>
-                        <a:t>5:35pm-5:50pm</a:t>
+                        <a:t>3:15pm-3:40pm</a:t>
                       </a:r>
                     </a:p>
                   </a:txBody>
@@ -7713,8 +7436,10 @@
                         </a:lnSpc>
                       </a:pPr>
                       <a:r>
-                        <a:rPr lang="en-US" sz="1600" i="0" dirty="0"/>
-                        <a:t>08</a:t>
+                        <a:rPr lang="en-US" sz="1800" i="0" dirty="0">
+                          <a:latin typeface="+mn-lt"/>
+                        </a:rPr>
+                        <a:t>07</a:t>
                       </a:r>
                     </a:p>
                   </a:txBody>
@@ -7731,8 +7456,10 @@
                         </a:lnSpc>
                       </a:pPr>
                       <a:r>
-                        <a:rPr lang="en-US" sz="1600" i="0" dirty="0"/>
-                        <a:t>Continuous Integration</a:t>
+                        <a:rPr lang="en-US" sz="1800" i="0" dirty="0">
+                          <a:latin typeface="+mn-lt"/>
+                        </a:rPr>
+                        <a:t>Refactoring</a:t>
                       </a:r>
                     </a:p>
                   </a:txBody>
@@ -7749,26 +7476,10 @@
                         </a:lnSpc>
                       </a:pPr>
                       <a:r>
-                        <a:rPr lang="en-US" sz="1600" dirty="0"/>
-                        <a:t>David E. Bernholdt, ORNL</a:t>
-                      </a:r>
-                    </a:p>
-                  </a:txBody>
-                  <a:tcPr/>
-                </a:tc>
-                <a:tc>
-                  <a:txBody>
-                    <a:bodyPr/>
-                    <a:lstStyle/>
-                    <a:p>
-                      <a:pPr>
-                        <a:lnSpc>
-                          <a:spcPct val="100000"/>
-                        </a:lnSpc>
-                      </a:pPr>
-                      <a:r>
-                        <a:rPr lang="en-US" sz="1600" dirty="0"/>
-                        <a:t>22:35-22:50</a:t>
+                        <a:rPr lang="en-US" sz="1800" dirty="0">
+                          <a:latin typeface="+mn-lt"/>
+                        </a:rPr>
+                        <a:t>Anshu Dubey, ANL</a:t>
                       </a:r>
                     </a:p>
                   </a:txBody>
@@ -7795,10 +7506,11 @@
                         </a:spcAft>
                       </a:pPr>
                       <a:r>
-                        <a:rPr lang="en-US" sz="1600" dirty="0">
+                        <a:rPr lang="en-US" sz="1800" dirty="0">
                           <a:effectLst/>
+                          <a:latin typeface="+mn-lt"/>
                         </a:rPr>
-                        <a:t>5:50pm-6:05pm</a:t>
+                        <a:t>3:40pm-3:55pm</a:t>
                       </a:r>
                     </a:p>
                   </a:txBody>
@@ -7815,8 +7527,10 @@
                         </a:lnSpc>
                       </a:pPr>
                       <a:r>
-                        <a:rPr lang="en-US" sz="1600" i="0" dirty="0"/>
-                        <a:t>09</a:t>
+                        <a:rPr lang="en-US" sz="1800" i="0" dirty="0">
+                          <a:latin typeface="+mn-lt"/>
+                        </a:rPr>
+                        <a:t>08</a:t>
                       </a:r>
                     </a:p>
                   </a:txBody>
@@ -7833,7 +7547,9 @@
                         </a:lnSpc>
                       </a:pPr>
                       <a:r>
-                        <a:rPr lang="en-US" sz="1600" i="0" dirty="0"/>
+                        <a:rPr lang="en-US" sz="1800" i="0" dirty="0">
+                          <a:latin typeface="+mn-lt"/>
+                        </a:rPr>
                         <a:t>Reproducibility</a:t>
                       </a:r>
                     </a:p>
@@ -7851,26 +7567,10 @@
                         </a:lnSpc>
                       </a:pPr>
                       <a:r>
-                        <a:rPr lang="en-US" sz="1600" dirty="0"/>
-                        <a:t>Patricia Grubel, LANL</a:t>
-                      </a:r>
-                    </a:p>
-                  </a:txBody>
-                  <a:tcPr/>
-                </a:tc>
-                <a:tc>
-                  <a:txBody>
-                    <a:bodyPr/>
-                    <a:lstStyle/>
-                    <a:p>
-                      <a:pPr>
-                        <a:lnSpc>
-                          <a:spcPct val="100000"/>
-                        </a:lnSpc>
-                      </a:pPr>
-                      <a:r>
-                        <a:rPr lang="en-US" sz="1600" dirty="0"/>
-                        <a:t>22:50-23:05</a:t>
+                        <a:rPr lang="en-US" sz="1800" dirty="0">
+                          <a:latin typeface="+mn-lt"/>
+                        </a:rPr>
+                        <a:t>David E. Bernholdt, ORNL</a:t>
                       </a:r>
                     </a:p>
                   </a:txBody>
@@ -7897,10 +7597,11 @@
                         </a:spcAft>
                       </a:pPr>
                       <a:r>
-                        <a:rPr lang="en-US" sz="1600" dirty="0">
+                        <a:rPr lang="en-US" sz="1800" dirty="0">
                           <a:effectLst/>
+                          <a:latin typeface="+mn-lt"/>
                         </a:rPr>
-                        <a:t>6:05pm-6:10pm</a:t>
+                        <a:t>3:55pm-4:00pm</a:t>
                       </a:r>
                     </a:p>
                   </a:txBody>
@@ -7917,8 +7618,10 @@
                         </a:lnSpc>
                       </a:pPr>
                       <a:r>
-                        <a:rPr lang="en-US" sz="1600" i="0" dirty="0"/>
-                        <a:t>10</a:t>
+                        <a:rPr lang="en-US" sz="1800" i="0" dirty="0">
+                          <a:latin typeface="+mn-lt"/>
+                        </a:rPr>
+                        <a:t>09</a:t>
                       </a:r>
                     </a:p>
                   </a:txBody>
@@ -7935,7 +7638,9 @@
                         </a:lnSpc>
                       </a:pPr>
                       <a:r>
-                        <a:rPr lang="en-US" sz="1600" i="0" dirty="0"/>
+                        <a:rPr lang="en-US" sz="1800" i="0" dirty="0">
+                          <a:latin typeface="+mn-lt"/>
+                        </a:rPr>
                         <a:t>Summary</a:t>
                       </a:r>
                     </a:p>
@@ -7953,26 +7658,10 @@
                         </a:lnSpc>
                       </a:pPr>
                       <a:r>
-                        <a:rPr lang="en-US" sz="1600" dirty="0"/>
+                        <a:rPr lang="en-US" sz="1800" dirty="0">
+                          <a:latin typeface="+mn-lt"/>
+                        </a:rPr>
                         <a:t>David E. Bernholdt, ORNL</a:t>
-                      </a:r>
-                    </a:p>
-                  </a:txBody>
-                  <a:tcPr/>
-                </a:tc>
-                <a:tc>
-                  <a:txBody>
-                    <a:bodyPr/>
-                    <a:lstStyle/>
-                    <a:p>
-                      <a:pPr>
-                        <a:lnSpc>
-                          <a:spcPct val="100000"/>
-                        </a:lnSpc>
-                      </a:pPr>
-                      <a:r>
-                        <a:rPr lang="en-US" sz="1600" dirty="0"/>
-                        <a:t>23:05-23:10</a:t>
                       </a:r>
                     </a:p>
                   </a:txBody>
@@ -7984,192 +7673,16 @@
                   </a:ext>
                 </a:extLst>
               </a:tr>
-              <a:tr h="370840">
-                <a:tc>
-                  <a:txBody>
-                    <a:bodyPr/>
-                    <a:lstStyle/>
-                    <a:p>
-                      <a:pPr rtl="0" fontAlgn="t">
-                        <a:spcBef>
-                          <a:spcPts val="0"/>
-                        </a:spcBef>
-                        <a:spcAft>
-                          <a:spcPts val="0"/>
-                        </a:spcAft>
-                      </a:pPr>
-                      <a:r>
-                        <a:rPr lang="en-US" sz="1600" i="1" dirty="0">
-                          <a:solidFill>
-                            <a:schemeClr val="tx2"/>
-                          </a:solidFill>
-                          <a:effectLst/>
-                        </a:rPr>
-                        <a:t>6:10pm-6:30pm</a:t>
-                      </a:r>
-                    </a:p>
-                  </a:txBody>
-                  <a:tcPr marL="63500" marR="63500" marT="63500" marB="63500"/>
-                </a:tc>
-                <a:tc>
-                  <a:txBody>
-                    <a:bodyPr/>
-                    <a:lstStyle/>
-                    <a:p>
-                      <a:pPr>
-                        <a:lnSpc>
-                          <a:spcPct val="100000"/>
-                        </a:lnSpc>
-                      </a:pPr>
-                      <a:endParaRPr lang="en-US" sz="1600" i="1" dirty="0">
-                        <a:solidFill>
-                          <a:schemeClr val="tx2"/>
-                        </a:solidFill>
-                      </a:endParaRPr>
-                    </a:p>
-                  </a:txBody>
-                  <a:tcPr/>
-                </a:tc>
-                <a:tc>
-                  <a:txBody>
-                    <a:bodyPr/>
-                    <a:lstStyle/>
-                    <a:p>
-                      <a:pPr>
-                        <a:lnSpc>
-                          <a:spcPct val="100000"/>
-                        </a:lnSpc>
-                      </a:pPr>
-                      <a:r>
-                        <a:rPr lang="en-US" sz="1600" i="1" dirty="0">
-                          <a:solidFill>
-                            <a:schemeClr val="tx2"/>
-                          </a:solidFill>
-                        </a:rPr>
-                        <a:t>Live Q&amp;A and demo of CI hands-on activities</a:t>
-                      </a:r>
-                    </a:p>
-                  </a:txBody>
-                  <a:tcPr/>
-                </a:tc>
-                <a:tc>
-                  <a:txBody>
-                    <a:bodyPr/>
-                    <a:lstStyle/>
-                    <a:p>
-                      <a:pPr>
-                        <a:lnSpc>
-                          <a:spcPct val="100000"/>
-                        </a:lnSpc>
-                      </a:pPr>
-                      <a:r>
-                        <a:rPr lang="en-US" sz="1600" i="1" dirty="0">
-                          <a:solidFill>
-                            <a:schemeClr val="tx2"/>
-                          </a:solidFill>
-                        </a:rPr>
-                        <a:t>David E. Bernholdt and All</a:t>
-                      </a:r>
-                    </a:p>
-                  </a:txBody>
-                  <a:tcPr/>
-                </a:tc>
-                <a:tc>
-                  <a:txBody>
-                    <a:bodyPr/>
-                    <a:lstStyle/>
-                    <a:p>
-                      <a:pPr>
-                        <a:lnSpc>
-                          <a:spcPct val="100000"/>
-                        </a:lnSpc>
-                      </a:pPr>
-                      <a:r>
-                        <a:rPr lang="en-US" sz="1600" i="1" dirty="0">
-                          <a:solidFill>
-                            <a:schemeClr val="tx2"/>
-                          </a:solidFill>
-                        </a:rPr>
-                        <a:t>23:10-23:30</a:t>
-                      </a:r>
-                    </a:p>
-                  </a:txBody>
-                  <a:tcPr/>
-                </a:tc>
-                <a:extLst>
-                  <a:ext uri="{0D108BD9-81ED-4DB2-BD59-A6C34878D82A}">
-                    <a16:rowId xmlns:a16="http://schemas.microsoft.com/office/drawing/2014/main" val="2700633054"/>
-                  </a:ext>
-                </a:extLst>
-              </a:tr>
             </a:tbl>
           </a:graphicData>
         </a:graphic>
       </p:graphicFrame>
-      <p:sp>
-        <p:nvSpPr>
-          <p:cNvPr id="5" name="Rectangle 4">
+      <p:grpSp>
+        <p:nvGrpSpPr>
+          <p:cNvPr id="5" name="Group 4">
             <a:extLst>
               <a:ext uri="{FF2B5EF4-FFF2-40B4-BE49-F238E27FC236}">
-                <a16:creationId xmlns:a16="http://schemas.microsoft.com/office/drawing/2014/main" id="{E4880E9D-796B-4059-866B-77E314ECAE90}"/>
-              </a:ext>
-            </a:extLst>
-          </p:cNvPr>
-          <p:cNvSpPr/>
-          <p:nvPr/>
-        </p:nvSpPr>
-        <p:spPr>
-          <a:xfrm>
-            <a:off x="482119" y="6488668"/>
-            <a:ext cx="11224586" cy="369332"/>
-          </a:xfrm>
-          <a:prstGeom prst="rect">
-            <a:avLst/>
-          </a:prstGeom>
-        </p:spPr>
-        <p:txBody>
-          <a:bodyPr wrap="square">
-            <a:spAutoFit/>
-          </a:bodyPr>
-          <a:lstStyle/>
-          <a:p>
-            <a:r>
-              <a:rPr lang="en-US" dirty="0">
-                <a:solidFill>
-                  <a:schemeClr val="accent2"/>
-                </a:solidFill>
-              </a:rPr>
-              <a:t>Please evaluate us: </a:t>
-            </a:r>
-            <a:r>
-              <a:rPr lang="en-US" u="sng" dirty="0">
-                <a:solidFill>
-                  <a:schemeClr val="accent2"/>
-                </a:solidFill>
-                <a:hlinkClick r:id="rId2">
-                  <a:extLst>
-                    <a:ext uri="{A12FA001-AC4F-418D-AE19-62706E023703}">
-                      <ahyp:hlinkClr xmlns:ahyp="http://schemas.microsoft.com/office/drawing/2018/hyperlinkcolor" val="tx"/>
-                    </a:ext>
-                  </a:extLst>
-                </a:hlinkClick>
-              </a:rPr>
-              <a:t>https://submissions.supercomputing.org/?page=Submit&amp;id=TutorialEvaluation&amp;site=sc20</a:t>
-            </a:r>
-            <a:endParaRPr lang="en-US" u="sng" dirty="0">
-              <a:solidFill>
-                <a:schemeClr val="accent2"/>
-              </a:solidFill>
-            </a:endParaRPr>
-          </a:p>
-        </p:txBody>
-      </p:sp>
-      <p:grpSp>
-        <p:nvGrpSpPr>
-          <p:cNvPr id="6" name="Group 5">
-            <a:extLst>
-              <a:ext uri="{FF2B5EF4-FFF2-40B4-BE49-F238E27FC236}">
-                <a16:creationId xmlns:a16="http://schemas.microsoft.com/office/drawing/2014/main" id="{B9669579-8C6A-4106-9209-D9CA21E1AFAF}"/>
+                <a16:creationId xmlns:a16="http://schemas.microsoft.com/office/drawing/2014/main" id="{E481C384-B67A-4E1A-9712-8751F487059D}"/>
               </a:ext>
             </a:extLst>
           </p:cNvPr>
@@ -8178,22 +7691,24 @@
         </p:nvGrpSpPr>
         <p:grpSpPr>
           <a:xfrm>
-            <a:off x="79513" y="1990146"/>
-            <a:ext cx="12029799" cy="390939"/>
+            <a:off x="649538" y="2122582"/>
+            <a:ext cx="10909739" cy="390939"/>
             <a:chOff x="79513" y="1653208"/>
             <a:chExt cx="12029799" cy="390939"/>
           </a:xfrm>
         </p:grpSpPr>
         <p:cxnSp>
           <p:nvCxnSpPr>
-            <p:cNvPr id="7" name="Straight Connector 6">
+            <p:cNvPr id="6" name="Straight Connector 5">
               <a:extLst>
                 <a:ext uri="{FF2B5EF4-FFF2-40B4-BE49-F238E27FC236}">
-                  <a16:creationId xmlns:a16="http://schemas.microsoft.com/office/drawing/2014/main" id="{2DAE54F5-E98A-481E-9F56-46D560D76AAA}"/>
+                  <a16:creationId xmlns:a16="http://schemas.microsoft.com/office/drawing/2014/main" id="{81FDDF4F-CEBB-4DB2-B54C-DBAC5A6EF985}"/>
                 </a:ext>
               </a:extLst>
             </p:cNvPr>
-            <p:cNvCxnSpPr/>
+            <p:cNvCxnSpPr>
+              <a:cxnSpLocks/>
+            </p:cNvCxnSpPr>
             <p:nvPr/>
           </p:nvCxnSpPr>
           <p:spPr>
@@ -8227,10 +7742,10 @@
         </p:cxnSp>
         <p:sp>
           <p:nvSpPr>
-            <p:cNvPr id="8" name="Arrow: Right 7">
+            <p:cNvPr id="7" name="Arrow: Right 7">
               <a:extLst>
                 <a:ext uri="{FF2B5EF4-FFF2-40B4-BE49-F238E27FC236}">
-                  <a16:creationId xmlns:a16="http://schemas.microsoft.com/office/drawing/2014/main" id="{A82B5609-8BB6-4280-AC83-8617D3F38825}"/>
+                  <a16:creationId xmlns:a16="http://schemas.microsoft.com/office/drawing/2014/main" id="{7844F343-E894-4FE0-A6FA-018D93AF813D}"/>
                 </a:ext>
               </a:extLst>
             </p:cNvPr>
@@ -8302,10 +7817,10 @@
         </p:sp>
         <p:sp>
           <p:nvSpPr>
-            <p:cNvPr id="9" name="Arrow: Right 8">
+            <p:cNvPr id="8" name="Arrow: Right 8">
               <a:extLst>
                 <a:ext uri="{FF2B5EF4-FFF2-40B4-BE49-F238E27FC236}">
-                  <a16:creationId xmlns:a16="http://schemas.microsoft.com/office/drawing/2014/main" id="{20860F8E-7C48-4618-B27B-31F5DB7564E4}"/>
+                  <a16:creationId xmlns:a16="http://schemas.microsoft.com/office/drawing/2014/main" id="{BBFB6C66-6CBA-4D40-8622-561E8F751365}"/>
                 </a:ext>
               </a:extLst>
             </p:cNvPr>
@@ -8379,7 +7894,7 @@
     </p:spTree>
     <p:extLst>
       <p:ext uri="{BB962C8B-B14F-4D97-AF65-F5344CB8AC3E}">
-        <p14:creationId xmlns:p14="http://schemas.microsoft.com/office/powerpoint/2010/main" val="3051450763"/>
+        <p14:creationId xmlns:p14="http://schemas.microsoft.com/office/powerpoint/2010/main" val="1979244594"/>
       </p:ext>
     </p:extLst>
   </p:cSld>
@@ -8508,13 +8023,13 @@
             </a:pPr>
             <a:r>
               <a:rPr lang="en-US" sz="1600" b="1" dirty="0"/>
-              <a:t>The requested citation the overall tutorial is: David E. Bernholdt, Anshu Dubey, Patricia A. Grubel, Rinku K. Gupta, Better Scientific Software tutorial, in SC ‘20: International Conference for High Performance Computing, Networking, Storage and Analysis, online, 2020. DOI: </a:t>
+              <a:t>The requested citation the overall tutorial is: David E. Bernholdt, Anshu Dubey, Rinku K. Gupta, and David M. Rogers, Better Scientific Software tutorial, in Improving Scientific Software conference, online, 2021. DOI: </a:t>
             </a:r>
             <a:r>
               <a:rPr lang="en-US" sz="1600" b="1" dirty="0">
                 <a:hlinkClick r:id="rId4"/>
               </a:rPr>
-              <a:t>10.6084/m9.figshare.12994376</a:t>
+              <a:t>10.6084/m9.figshare.14256257</a:t>
             </a:r>
             <a:endParaRPr lang="en-US" sz="1600" b="1" dirty="0"/>
           </a:p>
@@ -8720,7 +8235,7 @@
     </p:spTree>
     <p:extLst>
       <p:ext uri="{BB962C8B-B14F-4D97-AF65-F5344CB8AC3E}">
-        <p14:creationId xmlns:p14="http://schemas.microsoft.com/office/powerpoint/2010/main" val="597306865"/>
+        <p14:creationId xmlns:p14="http://schemas.microsoft.com/office/powerpoint/2010/main" val="978726433"/>
       </p:ext>
     </p:extLst>
   </p:cSld>
@@ -11814,21 +11329,6 @@
 </file>
 
 <file path=customXml/item1.xml><?xml version="1.0" encoding="utf-8"?>
-<?mso-contentType ?>
-<FormTemplates xmlns="http://schemas.microsoft.com/sharepoint/v3/contenttype/forms">
-  <Display>DocumentLibraryForm</Display>
-  <Edit>DocumentLibraryForm</Edit>
-  <New>DocumentLibraryForm</New>
-</FormTemplates>
-</file>
-
-<file path=customXml/item2.xml><?xml version="1.0" encoding="utf-8"?>
-<p:properties xmlns:p="http://schemas.microsoft.com/office/2006/metadata/properties" xmlns:xsi="http://www.w3.org/2001/XMLSchema-instance" xmlns:pc="http://schemas.microsoft.com/office/infopath/2007/PartnerControls">
-  <documentManagement/>
-</p:properties>
-</file>
-
-<file path=customXml/item3.xml><?xml version="1.0" encoding="utf-8"?>
 <ct:contentTypeSchema xmlns:ct="http://schemas.microsoft.com/office/2006/metadata/contentType" xmlns:ma="http://schemas.microsoft.com/office/2006/metadata/properties/metaAttributes" ct:_="" ma:_="" ma:contentTypeName="Document" ma:contentTypeID="0x010100565464437F680748A68B85EB6594EA7D" ma:contentTypeVersion="0" ma:contentTypeDescription="Create a new document." ma:contentTypeScope="" ma:versionID="fe3f4dd58d5914c51cfc6deaa8ad845c">
   <xsd:schema xmlns:xsd="http://www.w3.org/2001/XMLSchema" xmlns:p="http://schemas.microsoft.com/office/2006/metadata/properties" targetNamespace="http://schemas.microsoft.com/office/2006/metadata/properties" ma:root="true" ma:fieldsID="4aeb20c0e3442673af7ee10786458764">
     <xsd:element name="properties">
@@ -11877,10 +11377,32 @@
 </ct:contentTypeSchema>
 </file>
 
+<file path=customXml/item2.xml><?xml version="1.0" encoding="utf-8"?>
+<p:properties xmlns:p="http://schemas.microsoft.com/office/2006/metadata/properties" xmlns:xsi="http://www.w3.org/2001/XMLSchema-instance" xmlns:pc="http://schemas.microsoft.com/office/infopath/2007/PartnerControls">
+  <documentManagement/>
+</p:properties>
+</file>
+
+<file path=customXml/item3.xml><?xml version="1.0" encoding="utf-8"?>
+<?mso-contentType ?>
+<FormTemplates xmlns="http://schemas.microsoft.com/sharepoint/v3/contenttype/forms">
+  <Display>DocumentLibraryForm</Display>
+  <Edit>DocumentLibraryForm</Edit>
+  <New>DocumentLibraryForm</New>
+</FormTemplates>
+</file>
+
 <file path=customXml/itemProps1.xml><?xml version="1.0" encoding="utf-8"?>
-<ds:datastoreItem xmlns:ds="http://schemas.openxmlformats.org/officeDocument/2006/customXml" ds:itemID="{19E20559-B232-4371-8690-E3D8007EDB82}">
+<ds:datastoreItem xmlns:ds="http://schemas.openxmlformats.org/officeDocument/2006/customXml" ds:itemID="{E8DB7DEB-074E-4EE8-9B6E-FD277323109C}">
   <ds:schemaRefs>
-    <ds:schemaRef ds:uri="http://schemas.microsoft.com/sharepoint/v3/contenttype/forms"/>
+    <ds:schemaRef ds:uri="http://schemas.microsoft.com/office/2006/metadata/contentType"/>
+    <ds:schemaRef ds:uri="http://schemas.microsoft.com/office/2006/metadata/properties/metaAttributes"/>
+    <ds:schemaRef ds:uri="http://www.w3.org/2001/XMLSchema"/>
+    <ds:schemaRef ds:uri="http://schemas.microsoft.com/office/2006/metadata/properties"/>
+    <ds:schemaRef ds:uri="http://schemas.openxmlformats.org/package/2006/metadata/core-properties"/>
+    <ds:schemaRef ds:uri="http://purl.org/dc/elements/1.1/"/>
+    <ds:schemaRef ds:uri="http://purl.org/dc/terms/"/>
+    <ds:schemaRef ds:uri="http://schemas.microsoft.com/office/internal/2005/internalDocumentation"/>
   </ds:schemaRefs>
 </ds:datastoreItem>
 </file>
@@ -11901,16 +11423,9 @@
 </file>
 
 <file path=customXml/itemProps3.xml><?xml version="1.0" encoding="utf-8"?>
-<ds:datastoreItem xmlns:ds="http://schemas.openxmlformats.org/officeDocument/2006/customXml" ds:itemID="{E8DB7DEB-074E-4EE8-9B6E-FD277323109C}">
+<ds:datastoreItem xmlns:ds="http://schemas.openxmlformats.org/officeDocument/2006/customXml" ds:itemID="{19E20559-B232-4371-8690-E3D8007EDB82}">
   <ds:schemaRefs>
-    <ds:schemaRef ds:uri="http://schemas.microsoft.com/office/2006/metadata/contentType"/>
-    <ds:schemaRef ds:uri="http://schemas.microsoft.com/office/2006/metadata/properties/metaAttributes"/>
-    <ds:schemaRef ds:uri="http://www.w3.org/2001/XMLSchema"/>
-    <ds:schemaRef ds:uri="http://schemas.microsoft.com/office/2006/metadata/properties"/>
-    <ds:schemaRef ds:uri="http://schemas.openxmlformats.org/package/2006/metadata/core-properties"/>
-    <ds:schemaRef ds:uri="http://purl.org/dc/elements/1.1/"/>
-    <ds:schemaRef ds:uri="http://purl.org/dc/terms/"/>
-    <ds:schemaRef ds:uri="http://schemas.microsoft.com/office/internal/2005/internalDocumentation"/>
+    <ds:schemaRef ds:uri="http://schemas.microsoft.com/sharepoint/v3/contenttype/forms"/>
   </ds:schemaRefs>
 </ds:datastoreItem>
 </file>
</xml_diff>

<commit_message>
Improve consistency of formatting on title pages
</commit_message>
<xml_diff>
--- a/final-presentations/2021-03-25-iss/01-overview.pptx
+++ b/final-presentations/2021-03-25-iss/01-overview.pptx
@@ -4439,7 +4439,7 @@
           </a:p>
           <a:p>
             <a:r>
-              <a:rPr lang="en-US" sz="2000" dirty="0"/>
+              <a:rPr lang="en-US" dirty="0"/>
               <a:t>Better Scientific Software Tutorial, ISS, March 2021</a:t>
             </a:r>
           </a:p>
@@ -11329,6 +11329,12 @@
 </file>
 
 <file path=customXml/item1.xml><?xml version="1.0" encoding="utf-8"?>
+<p:properties xmlns:p="http://schemas.microsoft.com/office/2006/metadata/properties" xmlns:xsi="http://www.w3.org/2001/XMLSchema-instance" xmlns:pc="http://schemas.microsoft.com/office/infopath/2007/PartnerControls">
+  <documentManagement/>
+</p:properties>
+</file>
+
+<file path=customXml/item2.xml><?xml version="1.0" encoding="utf-8"?>
 <ct:contentTypeSchema xmlns:ct="http://schemas.microsoft.com/office/2006/metadata/contentType" xmlns:ma="http://schemas.microsoft.com/office/2006/metadata/properties/metaAttributes" ct:_="" ma:_="" ma:contentTypeName="Document" ma:contentTypeID="0x010100565464437F680748A68B85EB6594EA7D" ma:contentTypeVersion="0" ma:contentTypeDescription="Create a new document." ma:contentTypeScope="" ma:versionID="fe3f4dd58d5914c51cfc6deaa8ad845c">
   <xsd:schema xmlns:xsd="http://www.w3.org/2001/XMLSchema" xmlns:p="http://schemas.microsoft.com/office/2006/metadata/properties" targetNamespace="http://schemas.microsoft.com/office/2006/metadata/properties" ma:root="true" ma:fieldsID="4aeb20c0e3442673af7ee10786458764">
     <xsd:element name="properties">
@@ -11377,12 +11383,6 @@
 </ct:contentTypeSchema>
 </file>
 
-<file path=customXml/item2.xml><?xml version="1.0" encoding="utf-8"?>
-<p:properties xmlns:p="http://schemas.microsoft.com/office/2006/metadata/properties" xmlns:xsi="http://www.w3.org/2001/XMLSchema-instance" xmlns:pc="http://schemas.microsoft.com/office/infopath/2007/PartnerControls">
-  <documentManagement/>
-</p:properties>
-</file>
-
 <file path=customXml/item3.xml><?xml version="1.0" encoding="utf-8"?>
 <?mso-contentType ?>
 <FormTemplates xmlns="http://schemas.microsoft.com/sharepoint/v3/contenttype/forms">
@@ -11393,6 +11393,21 @@
 </file>
 
 <file path=customXml/itemProps1.xml><?xml version="1.0" encoding="utf-8"?>
+<ds:datastoreItem xmlns:ds="http://schemas.openxmlformats.org/officeDocument/2006/customXml" ds:itemID="{A50EC660-24D0-43A0-AE5E-E274115E726B}">
+  <ds:schemaRefs>
+    <ds:schemaRef ds:uri="http://www.w3.org/XML/1998/namespace"/>
+    <ds:schemaRef ds:uri="http://schemas.microsoft.com/office/2006/documentManagement/types"/>
+    <ds:schemaRef ds:uri="http://purl.org/dc/elements/1.1/"/>
+    <ds:schemaRef ds:uri="http://purl.org/dc/terms/"/>
+    <ds:schemaRef ds:uri="http://schemas.openxmlformats.org/package/2006/metadata/core-properties"/>
+    <ds:schemaRef ds:uri="http://schemas.microsoft.com/office/2006/metadata/properties"/>
+    <ds:schemaRef ds:uri="http://purl.org/dc/dcmitype/"/>
+    <ds:schemaRef ds:uri="http://schemas.microsoft.com/office/infopath/2007/PartnerControls"/>
+  </ds:schemaRefs>
+</ds:datastoreItem>
+</file>
+
+<file path=customXml/itemProps2.xml><?xml version="1.0" encoding="utf-8"?>
 <ds:datastoreItem xmlns:ds="http://schemas.openxmlformats.org/officeDocument/2006/customXml" ds:itemID="{E8DB7DEB-074E-4EE8-9B6E-FD277323109C}">
   <ds:schemaRefs>
     <ds:schemaRef ds:uri="http://schemas.microsoft.com/office/2006/metadata/contentType"/>
@@ -11407,21 +11422,6 @@
 </ds:datastoreItem>
 </file>
 
-<file path=customXml/itemProps2.xml><?xml version="1.0" encoding="utf-8"?>
-<ds:datastoreItem xmlns:ds="http://schemas.openxmlformats.org/officeDocument/2006/customXml" ds:itemID="{A50EC660-24D0-43A0-AE5E-E274115E726B}">
-  <ds:schemaRefs>
-    <ds:schemaRef ds:uri="http://www.w3.org/XML/1998/namespace"/>
-    <ds:schemaRef ds:uri="http://schemas.microsoft.com/office/2006/documentManagement/types"/>
-    <ds:schemaRef ds:uri="http://purl.org/dc/elements/1.1/"/>
-    <ds:schemaRef ds:uri="http://purl.org/dc/terms/"/>
-    <ds:schemaRef ds:uri="http://schemas.openxmlformats.org/package/2006/metadata/core-properties"/>
-    <ds:schemaRef ds:uri="http://schemas.microsoft.com/office/2006/metadata/properties"/>
-    <ds:schemaRef ds:uri="http://purl.org/dc/dcmitype/"/>
-    <ds:schemaRef ds:uri="http://schemas.microsoft.com/office/infopath/2007/PartnerControls"/>
-  </ds:schemaRefs>
-</ds:datastoreItem>
-</file>
-
 <file path=customXml/itemProps3.xml><?xml version="1.0" encoding="utf-8"?>
 <ds:datastoreItem xmlns:ds="http://schemas.openxmlformats.org/officeDocument/2006/customXml" ds:itemID="{19E20559-B232-4371-8690-E3D8007EDB82}">
   <ds:schemaRefs>

</xml_diff>